<commit_message>
Made progress with milestone 3
</commit_message>
<xml_diff>
--- a/MGT5824-Tech-based Entrepreneurship/Assignments/Milestone #3 - Business Model Design & AI-powered Operating Models/gasser18-milestone3_slides.pptx
+++ b/MGT5824-Tech-based Entrepreneurship/Assignments/Milestone #3 - Business Model Design & AI-powered Operating Models/gasser18-milestone3_slides.pptx
@@ -4816,6 +4816,10 @@
               </a:spcAft>
               <a:buNone/>
             </a:pPr>
+            <a:r>
+              <a:rPr lang="en-US" dirty="0"/>
+              <a:t>In summary, AI contributes significantly to the scalability of Lawn Buddy's operating model by automating processes, predicting demand, personalizing experiences, optimizing resources, and enabling data-driven decision-making. These AI-driven capabilities empower the app to handle a growing user base, expand into new markets, and deliver an exceptional and efficient lawn mowing scheduling service to customers and service providers. As the app scales, AI's role in maintaining a positive operating model and supporting sustainable growth becomes increasingly critical.</a:t>
+            </a:r>
             <a:endParaRPr dirty="0"/>
           </a:p>
         </p:txBody>
@@ -4925,6 +4929,10 @@
               </a:spcAft>
               <a:buNone/>
             </a:pPr>
+            <a:r>
+              <a:rPr lang="en-US" dirty="0"/>
+              <a:t>In summary, AI significantly contributes to the viability and sustainability of Lawn Buddy's operating model by optimizing resources, enhancing the customer experience, supporting scalability, enabling data-driven decisions, ensuring platform reliability, and fostering continuous improvement. By embracing AI-driven solutions, Lawn Buddy can build a resilient and future-proof business, positioning itself for long-term success in the competitive market of AI-driven lawn mowing scheduling services.</a:t>
+            </a:r>
             <a:endParaRPr dirty="0"/>
           </a:p>
         </p:txBody>
@@ -45930,6 +45938,288 @@
           </a:p>
         </p:txBody>
       </p:sp>
+      <p:sp>
+        <p:nvSpPr>
+          <p:cNvPr id="5" name="TextBox 4">
+            <a:extLst>
+              <a:ext uri="{FF2B5EF4-FFF2-40B4-BE49-F238E27FC236}">
+                <a16:creationId xmlns:a16="http://schemas.microsoft.com/office/drawing/2014/main" id="{4946A67F-B9C3-739E-8FD3-152EC78A4BFD}"/>
+              </a:ext>
+            </a:extLst>
+          </p:cNvPr>
+          <p:cNvSpPr txBox="1"/>
+          <p:nvPr/>
+        </p:nvSpPr>
+        <p:spPr>
+          <a:xfrm>
+            <a:off x="291155" y="1121800"/>
+            <a:ext cx="8561690" cy="3693319"/>
+          </a:xfrm>
+          <a:prstGeom prst="rect">
+            <a:avLst/>
+          </a:prstGeom>
+          <a:noFill/>
+        </p:spPr>
+        <p:txBody>
+          <a:bodyPr wrap="square">
+            <a:spAutoFit/>
+          </a:bodyPr>
+          <a:lstStyle/>
+          <a:p>
+            <a:pPr marL="228600" indent="-228600">
+              <a:buFont typeface="+mj-lt"/>
+              <a:buAutoNum type="arabicPeriod"/>
+            </a:pPr>
+            <a:r>
+              <a:rPr lang="en-US" sz="900" b="1" dirty="0">
+                <a:latin typeface="Lato" panose="020F0502020204030203" pitchFamily="34" charset="0"/>
+                <a:ea typeface="Lato" panose="020F0502020204030203" pitchFamily="34" charset="0"/>
+                <a:cs typeface="Lato" panose="020F0502020204030203" pitchFamily="34" charset="0"/>
+              </a:rPr>
+              <a:t>Automated Scheduling and Routing:</a:t>
+            </a:r>
+            <a:r>
+              <a:rPr lang="en-US" sz="900" dirty="0">
+                <a:latin typeface="Lato" panose="020F0502020204030203" pitchFamily="34" charset="0"/>
+                <a:ea typeface="Lato" panose="020F0502020204030203" pitchFamily="34" charset="0"/>
+                <a:cs typeface="Lato" panose="020F0502020204030203" pitchFamily="34" charset="0"/>
+              </a:rPr>
+              <a:t> AI-powered scheduling algorithms can efficiently match service providers with customers, optimizing routes for the mowing services. This automation reduces the manual effort required to coordinate schedules, allowing Lawn Buddy to handle a larger number of service requests without significant human intervention.</a:t>
+            </a:r>
+          </a:p>
+          <a:p>
+            <a:pPr marL="228600" indent="-228600">
+              <a:buFont typeface="+mj-lt"/>
+              <a:buAutoNum type="arabicPeriod"/>
+            </a:pPr>
+            <a:endParaRPr lang="en-US" sz="900" dirty="0">
+              <a:latin typeface="Lato" panose="020F0502020204030203" pitchFamily="34" charset="0"/>
+              <a:ea typeface="Lato" panose="020F0502020204030203" pitchFamily="34" charset="0"/>
+              <a:cs typeface="Lato" panose="020F0502020204030203" pitchFamily="34" charset="0"/>
+            </a:endParaRPr>
+          </a:p>
+          <a:p>
+            <a:pPr marL="228600" indent="-228600">
+              <a:buFont typeface="+mj-lt"/>
+              <a:buAutoNum type="arabicPeriod"/>
+            </a:pPr>
+            <a:r>
+              <a:rPr lang="en-US" sz="900" b="1" dirty="0">
+                <a:latin typeface="Lato" panose="020F0502020204030203" pitchFamily="34" charset="0"/>
+                <a:ea typeface="Lato" panose="020F0502020204030203" pitchFamily="34" charset="0"/>
+                <a:cs typeface="Lato" panose="020F0502020204030203" pitchFamily="34" charset="0"/>
+              </a:rPr>
+              <a:t>Real-time Demand Prediction:</a:t>
+            </a:r>
+            <a:r>
+              <a:rPr lang="en-US" sz="900" dirty="0">
+                <a:latin typeface="Lato" panose="020F0502020204030203" pitchFamily="34" charset="0"/>
+                <a:ea typeface="Lato" panose="020F0502020204030203" pitchFamily="34" charset="0"/>
+                <a:cs typeface="Lato" panose="020F0502020204030203" pitchFamily="34" charset="0"/>
+              </a:rPr>
+              <a:t> AI can analyze historical data, weather patterns, and customer behavior to predict demand for lawn mowing services accurately. With this insight, Lawn Buddy can proactively allocate resources and plan for peak demand periods, ensuring a seamless experience for customers and service providers.</a:t>
+            </a:r>
+          </a:p>
+          <a:p>
+            <a:pPr marL="228600" indent="-228600">
+              <a:buFont typeface="+mj-lt"/>
+              <a:buAutoNum type="arabicPeriod"/>
+            </a:pPr>
+            <a:endParaRPr lang="en-US" sz="900" dirty="0">
+              <a:latin typeface="Lato" panose="020F0502020204030203" pitchFamily="34" charset="0"/>
+              <a:ea typeface="Lato" panose="020F0502020204030203" pitchFamily="34" charset="0"/>
+              <a:cs typeface="Lato" panose="020F0502020204030203" pitchFamily="34" charset="0"/>
+            </a:endParaRPr>
+          </a:p>
+          <a:p>
+            <a:pPr marL="228600" indent="-228600">
+              <a:buFont typeface="+mj-lt"/>
+              <a:buAutoNum type="arabicPeriod"/>
+            </a:pPr>
+            <a:r>
+              <a:rPr lang="en-US" sz="900" b="1" dirty="0">
+                <a:latin typeface="Lato" panose="020F0502020204030203" pitchFamily="34" charset="0"/>
+                <a:ea typeface="Lato" panose="020F0502020204030203" pitchFamily="34" charset="0"/>
+                <a:cs typeface="Lato" panose="020F0502020204030203" pitchFamily="34" charset="0"/>
+              </a:rPr>
+              <a:t>Dynamic Pricing:</a:t>
+            </a:r>
+            <a:r>
+              <a:rPr lang="en-US" sz="900" dirty="0">
+                <a:latin typeface="Lato" panose="020F0502020204030203" pitchFamily="34" charset="0"/>
+                <a:ea typeface="Lato" panose="020F0502020204030203" pitchFamily="34" charset="0"/>
+                <a:cs typeface="Lato" panose="020F0502020204030203" pitchFamily="34" charset="0"/>
+              </a:rPr>
+              <a:t> AI algorithms can adjust pricing based on demand, availability, and other market factors. Dynamic pricing enables Lawn Buddy to maximize revenue during high-demand periods and attract more customers during off-peak times. This flexibility allows the app to adapt to changing market conditions and maintain profitability.</a:t>
+            </a:r>
+          </a:p>
+          <a:p>
+            <a:pPr marL="228600" indent="-228600">
+              <a:buFont typeface="+mj-lt"/>
+              <a:buAutoNum type="arabicPeriod"/>
+            </a:pPr>
+            <a:endParaRPr lang="en-US" sz="900" dirty="0">
+              <a:latin typeface="Lato" panose="020F0502020204030203" pitchFamily="34" charset="0"/>
+              <a:ea typeface="Lato" panose="020F0502020204030203" pitchFamily="34" charset="0"/>
+              <a:cs typeface="Lato" panose="020F0502020204030203" pitchFamily="34" charset="0"/>
+            </a:endParaRPr>
+          </a:p>
+          <a:p>
+            <a:pPr marL="228600" indent="-228600">
+              <a:buFont typeface="+mj-lt"/>
+              <a:buAutoNum type="arabicPeriod"/>
+            </a:pPr>
+            <a:r>
+              <a:rPr lang="en-US" sz="900" b="1" dirty="0">
+                <a:latin typeface="Lato" panose="020F0502020204030203" pitchFamily="34" charset="0"/>
+                <a:ea typeface="Lato" panose="020F0502020204030203" pitchFamily="34" charset="0"/>
+                <a:cs typeface="Lato" panose="020F0502020204030203" pitchFamily="34" charset="0"/>
+              </a:rPr>
+              <a:t>Personalized Customer Experience:</a:t>
+            </a:r>
+            <a:r>
+              <a:rPr lang="en-US" sz="900" dirty="0">
+                <a:latin typeface="Lato" panose="020F0502020204030203" pitchFamily="34" charset="0"/>
+                <a:ea typeface="Lato" panose="020F0502020204030203" pitchFamily="34" charset="0"/>
+                <a:cs typeface="Lato" panose="020F0502020204030203" pitchFamily="34" charset="0"/>
+              </a:rPr>
+              <a:t> AI-driven personalization can tailor the user experience for both customers and service providers. By understanding their preferences and needs, Lawn Buddy can deliver targeted recommendations, promotions, and support, fostering customer loyalty and satisfaction.</a:t>
+            </a:r>
+          </a:p>
+          <a:p>
+            <a:pPr marL="228600" indent="-228600">
+              <a:buFont typeface="+mj-lt"/>
+              <a:buAutoNum type="arabicPeriod"/>
+            </a:pPr>
+            <a:endParaRPr lang="en-US" sz="900" dirty="0">
+              <a:latin typeface="Lato" panose="020F0502020204030203" pitchFamily="34" charset="0"/>
+              <a:ea typeface="Lato" panose="020F0502020204030203" pitchFamily="34" charset="0"/>
+              <a:cs typeface="Lato" panose="020F0502020204030203" pitchFamily="34" charset="0"/>
+            </a:endParaRPr>
+          </a:p>
+          <a:p>
+            <a:pPr marL="228600" indent="-228600">
+              <a:buFont typeface="+mj-lt"/>
+              <a:buAutoNum type="arabicPeriod"/>
+            </a:pPr>
+            <a:r>
+              <a:rPr lang="en-US" sz="900" b="1" dirty="0">
+                <a:latin typeface="Lato" panose="020F0502020204030203" pitchFamily="34" charset="0"/>
+                <a:ea typeface="Lato" panose="020F0502020204030203" pitchFamily="34" charset="0"/>
+                <a:cs typeface="Lato" panose="020F0502020204030203" pitchFamily="34" charset="0"/>
+              </a:rPr>
+              <a:t>Intelligent Customer Support:</a:t>
+            </a:r>
+            <a:r>
+              <a:rPr lang="en-US" sz="900" dirty="0">
+                <a:latin typeface="Lato" panose="020F0502020204030203" pitchFamily="34" charset="0"/>
+                <a:ea typeface="Lato" panose="020F0502020204030203" pitchFamily="34" charset="0"/>
+                <a:cs typeface="Lato" panose="020F0502020204030203" pitchFamily="34" charset="0"/>
+              </a:rPr>
+              <a:t> AI-powered chatbots and virtual assistants can handle customer inquiries and support requests efficiently, reducing response times and increasing customer satisfaction. This automation scales well as the user base grows, ensuring prompt assistance without the need for a large support team.</a:t>
+            </a:r>
+          </a:p>
+          <a:p>
+            <a:pPr marL="228600" indent="-228600">
+              <a:buFont typeface="+mj-lt"/>
+              <a:buAutoNum type="arabicPeriod"/>
+            </a:pPr>
+            <a:endParaRPr lang="en-US" sz="900" dirty="0">
+              <a:latin typeface="Lato" panose="020F0502020204030203" pitchFamily="34" charset="0"/>
+              <a:ea typeface="Lato" panose="020F0502020204030203" pitchFamily="34" charset="0"/>
+              <a:cs typeface="Lato" panose="020F0502020204030203" pitchFamily="34" charset="0"/>
+            </a:endParaRPr>
+          </a:p>
+          <a:p>
+            <a:pPr marL="228600" indent="-228600">
+              <a:buFont typeface="+mj-lt"/>
+              <a:buAutoNum type="arabicPeriod"/>
+            </a:pPr>
+            <a:r>
+              <a:rPr lang="en-US" sz="900" b="1" dirty="0">
+                <a:latin typeface="Lato" panose="020F0502020204030203" pitchFamily="34" charset="0"/>
+                <a:ea typeface="Lato" panose="020F0502020204030203" pitchFamily="34" charset="0"/>
+                <a:cs typeface="Lato" panose="020F0502020204030203" pitchFamily="34" charset="0"/>
+              </a:rPr>
+              <a:t>Predictive Maintenance:</a:t>
+            </a:r>
+            <a:r>
+              <a:rPr lang="en-US" sz="900" dirty="0">
+                <a:latin typeface="Lato" panose="020F0502020204030203" pitchFamily="34" charset="0"/>
+                <a:ea typeface="Lato" panose="020F0502020204030203" pitchFamily="34" charset="0"/>
+                <a:cs typeface="Lato" panose="020F0502020204030203" pitchFamily="34" charset="0"/>
+              </a:rPr>
+              <a:t> For Lawn Buddy to ensure that its platform is always running smoothly, AI can be employed for predictive maintenance. By analyzing data from the app and its underlying infrastructure, AI can predict and prevent potential issues, reducing downtime and enhancing reliability as the user base expands.</a:t>
+            </a:r>
+          </a:p>
+          <a:p>
+            <a:pPr marL="228600" indent="-228600">
+              <a:buFont typeface="+mj-lt"/>
+              <a:buAutoNum type="arabicPeriod"/>
+            </a:pPr>
+            <a:endParaRPr lang="en-US" sz="900" dirty="0">
+              <a:latin typeface="Lato" panose="020F0502020204030203" pitchFamily="34" charset="0"/>
+              <a:ea typeface="Lato" panose="020F0502020204030203" pitchFamily="34" charset="0"/>
+              <a:cs typeface="Lato" panose="020F0502020204030203" pitchFamily="34" charset="0"/>
+            </a:endParaRPr>
+          </a:p>
+          <a:p>
+            <a:pPr marL="228600" indent="-228600">
+              <a:buFont typeface="+mj-lt"/>
+              <a:buAutoNum type="arabicPeriod"/>
+            </a:pPr>
+            <a:r>
+              <a:rPr lang="en-US" sz="900" b="1" dirty="0">
+                <a:latin typeface="Lato" panose="020F0502020204030203" pitchFamily="34" charset="0"/>
+                <a:ea typeface="Lato" panose="020F0502020204030203" pitchFamily="34" charset="0"/>
+                <a:cs typeface="Lato" panose="020F0502020204030203" pitchFamily="34" charset="0"/>
+              </a:rPr>
+              <a:t>Market Expansion:</a:t>
+            </a:r>
+            <a:r>
+              <a:rPr lang="en-US" sz="900" dirty="0">
+                <a:latin typeface="Lato" panose="020F0502020204030203" pitchFamily="34" charset="0"/>
+                <a:ea typeface="Lato" panose="020F0502020204030203" pitchFamily="34" charset="0"/>
+                <a:cs typeface="Lato" panose="020F0502020204030203" pitchFamily="34" charset="0"/>
+              </a:rPr>
+              <a:t> AI can be leveraged to analyze market trends, customer demographics, and competitor data to identify new opportunities for geographic expansion. As Lawn Buddy scales, AI can assist in identifying and entering new markets, driving further growth.</a:t>
+            </a:r>
+          </a:p>
+          <a:p>
+            <a:pPr marL="228600" indent="-228600">
+              <a:buFont typeface="+mj-lt"/>
+              <a:buAutoNum type="arabicPeriod"/>
+            </a:pPr>
+            <a:endParaRPr lang="en-US" sz="900" dirty="0">
+              <a:latin typeface="Lato" panose="020F0502020204030203" pitchFamily="34" charset="0"/>
+              <a:ea typeface="Lato" panose="020F0502020204030203" pitchFamily="34" charset="0"/>
+              <a:cs typeface="Lato" panose="020F0502020204030203" pitchFamily="34" charset="0"/>
+            </a:endParaRPr>
+          </a:p>
+          <a:p>
+            <a:pPr marL="228600" indent="-228600">
+              <a:buFont typeface="+mj-lt"/>
+              <a:buAutoNum type="arabicPeriod"/>
+            </a:pPr>
+            <a:r>
+              <a:rPr lang="en-US" sz="900" b="1" dirty="0">
+                <a:latin typeface="Lato" panose="020F0502020204030203" pitchFamily="34" charset="0"/>
+                <a:ea typeface="Lato" panose="020F0502020204030203" pitchFamily="34" charset="0"/>
+                <a:cs typeface="Lato" panose="020F0502020204030203" pitchFamily="34" charset="0"/>
+              </a:rPr>
+              <a:t>Efficient Resource Allocation:</a:t>
+            </a:r>
+            <a:r>
+              <a:rPr lang="en-US" sz="900" dirty="0">
+                <a:latin typeface="Lato" panose="020F0502020204030203" pitchFamily="34" charset="0"/>
+                <a:ea typeface="Lato" panose="020F0502020204030203" pitchFamily="34" charset="0"/>
+                <a:cs typeface="Lato" panose="020F0502020204030203" pitchFamily="34" charset="0"/>
+              </a:rPr>
+              <a:t> AI can optimize the allocation of resources, including service providers, equipment, and support personnel. This ensures that Lawn Buddy utilizes its resources effectively, minimizing waste and maximizing efficiency</a:t>
+            </a:r>
+          </a:p>
+        </p:txBody>
+      </p:sp>
     </p:spTree>
     <p:extLst>
       <p:ext uri="{BB962C8B-B14F-4D97-AF65-F5344CB8AC3E}">
@@ -46032,6 +46322,321 @@
               <a:latin typeface="Poppins" panose="00000500000000000000" pitchFamily="2" charset="0"/>
               <a:cs typeface="Poppins" panose="00000500000000000000" pitchFamily="2" charset="0"/>
             </a:endParaRPr>
+          </a:p>
+        </p:txBody>
+      </p:sp>
+      <p:sp>
+        <p:nvSpPr>
+          <p:cNvPr id="3" name="TextBox 2">
+            <a:extLst>
+              <a:ext uri="{FF2B5EF4-FFF2-40B4-BE49-F238E27FC236}">
+                <a16:creationId xmlns:a16="http://schemas.microsoft.com/office/drawing/2014/main" id="{965B3E7C-1166-F5EA-DA5B-1CC940B422DC}"/>
+              </a:ext>
+            </a:extLst>
+          </p:cNvPr>
+          <p:cNvSpPr txBox="1"/>
+          <p:nvPr/>
+        </p:nvSpPr>
+        <p:spPr>
+          <a:xfrm>
+            <a:off x="292608" y="1121800"/>
+            <a:ext cx="8558784" cy="3693319"/>
+          </a:xfrm>
+          <a:prstGeom prst="rect">
+            <a:avLst/>
+          </a:prstGeom>
+          <a:noFill/>
+        </p:spPr>
+        <p:txBody>
+          <a:bodyPr wrap="square">
+            <a:spAutoFit/>
+          </a:bodyPr>
+          <a:lstStyle/>
+          <a:p>
+            <a:pPr marL="228600" indent="-228600">
+              <a:buFont typeface="+mj-lt"/>
+              <a:buAutoNum type="arabicPeriod"/>
+            </a:pPr>
+            <a:r>
+              <a:rPr lang="en-US" sz="900" b="1" dirty="0">
+                <a:latin typeface="Lato" panose="020F0502020204030203" pitchFamily="34" charset="0"/>
+                <a:ea typeface="Lato" panose="020F0502020204030203" pitchFamily="34" charset="0"/>
+                <a:cs typeface="Lato" panose="020F0502020204030203" pitchFamily="34" charset="0"/>
+              </a:rPr>
+              <a:t>Efficient Resource Utilization:</a:t>
+            </a:r>
+            <a:r>
+              <a:rPr lang="en-US" sz="900" dirty="0">
+                <a:latin typeface="Lato" panose="020F0502020204030203" pitchFamily="34" charset="0"/>
+                <a:ea typeface="Lato" panose="020F0502020204030203" pitchFamily="34" charset="0"/>
+                <a:cs typeface="Lato" panose="020F0502020204030203" pitchFamily="34" charset="0"/>
+              </a:rPr>
+              <a:t> AI-powered algorithms can optimize the allocation of resources, such as matching service providers with customers based on location and availability. This efficiency reduces operational costs, ensures effective resource utilization, and contributes to the overall viability of the business.</a:t>
+            </a:r>
+          </a:p>
+          <a:p>
+            <a:pPr marL="228600" indent="-228600">
+              <a:buFont typeface="+mj-lt"/>
+              <a:buAutoNum type="arabicPeriod"/>
+            </a:pPr>
+            <a:endParaRPr lang="en-US" sz="900" dirty="0">
+              <a:latin typeface="Lato" panose="020F0502020204030203" pitchFamily="34" charset="0"/>
+              <a:ea typeface="Lato" panose="020F0502020204030203" pitchFamily="34" charset="0"/>
+              <a:cs typeface="Lato" panose="020F0502020204030203" pitchFamily="34" charset="0"/>
+            </a:endParaRPr>
+          </a:p>
+          <a:p>
+            <a:pPr marL="228600" indent="-228600">
+              <a:buFont typeface="+mj-lt"/>
+              <a:buAutoNum type="arabicPeriod"/>
+            </a:pPr>
+            <a:r>
+              <a:rPr lang="en-US" sz="900" b="1" dirty="0">
+                <a:latin typeface="Lato" panose="020F0502020204030203" pitchFamily="34" charset="0"/>
+                <a:ea typeface="Lato" panose="020F0502020204030203" pitchFamily="34" charset="0"/>
+                <a:cs typeface="Lato" panose="020F0502020204030203" pitchFamily="34" charset="0"/>
+              </a:rPr>
+              <a:t>Enhanced Customer Experience:</a:t>
+            </a:r>
+            <a:r>
+              <a:rPr lang="en-US" sz="900" dirty="0">
+                <a:latin typeface="Lato" panose="020F0502020204030203" pitchFamily="34" charset="0"/>
+                <a:ea typeface="Lato" panose="020F0502020204030203" pitchFamily="34" charset="0"/>
+                <a:cs typeface="Lato" panose="020F0502020204030203" pitchFamily="34" charset="0"/>
+              </a:rPr>
+              <a:t> Personalized recommendations, dynamic pricing, and real-time support through AI-driven chatbots contribute to a positive customer experience. Satisfied customers are more likely to be repeat users, leading to higher retention rates and long-term sustainability.</a:t>
+            </a:r>
+          </a:p>
+          <a:p>
+            <a:pPr marL="228600" indent="-228600">
+              <a:buFont typeface="+mj-lt"/>
+              <a:buAutoNum type="arabicPeriod"/>
+            </a:pPr>
+            <a:endParaRPr lang="en-US" sz="900" dirty="0">
+              <a:latin typeface="Lato" panose="020F0502020204030203" pitchFamily="34" charset="0"/>
+              <a:ea typeface="Lato" panose="020F0502020204030203" pitchFamily="34" charset="0"/>
+              <a:cs typeface="Lato" panose="020F0502020204030203" pitchFamily="34" charset="0"/>
+            </a:endParaRPr>
+          </a:p>
+          <a:p>
+            <a:pPr marL="228600" indent="-228600">
+              <a:buFont typeface="+mj-lt"/>
+              <a:buAutoNum type="arabicPeriod"/>
+            </a:pPr>
+            <a:r>
+              <a:rPr lang="en-US" sz="900" b="1" dirty="0">
+                <a:latin typeface="Lato" panose="020F0502020204030203" pitchFamily="34" charset="0"/>
+                <a:ea typeface="Lato" panose="020F0502020204030203" pitchFamily="34" charset="0"/>
+                <a:cs typeface="Lato" panose="020F0502020204030203" pitchFamily="34" charset="0"/>
+              </a:rPr>
+              <a:t>Scalability and Flexibility:</a:t>
+            </a:r>
+            <a:r>
+              <a:rPr lang="en-US" sz="900" dirty="0">
+                <a:latin typeface="Lato" panose="020F0502020204030203" pitchFamily="34" charset="0"/>
+                <a:ea typeface="Lato" panose="020F0502020204030203" pitchFamily="34" charset="0"/>
+                <a:cs typeface="Lato" panose="020F0502020204030203" pitchFamily="34" charset="0"/>
+              </a:rPr>
+              <a:t> As the user base grows, AI allows Lawn Buddy to scale its operations without a proportional increase in manual labor. This scalability ensures that the app can handle a larger number of service requests and accommodate future growth.</a:t>
+            </a:r>
+          </a:p>
+          <a:p>
+            <a:pPr marL="228600" indent="-228600">
+              <a:buFont typeface="+mj-lt"/>
+              <a:buAutoNum type="arabicPeriod"/>
+            </a:pPr>
+            <a:endParaRPr lang="en-US" sz="900" dirty="0">
+              <a:latin typeface="Lato" panose="020F0502020204030203" pitchFamily="34" charset="0"/>
+              <a:ea typeface="Lato" panose="020F0502020204030203" pitchFamily="34" charset="0"/>
+              <a:cs typeface="Lato" panose="020F0502020204030203" pitchFamily="34" charset="0"/>
+            </a:endParaRPr>
+          </a:p>
+          <a:p>
+            <a:pPr marL="228600" indent="-228600">
+              <a:buFont typeface="+mj-lt"/>
+              <a:buAutoNum type="arabicPeriod"/>
+            </a:pPr>
+            <a:r>
+              <a:rPr lang="en-US" sz="900" b="1" dirty="0">
+                <a:latin typeface="Lato" panose="020F0502020204030203" pitchFamily="34" charset="0"/>
+                <a:ea typeface="Lato" panose="020F0502020204030203" pitchFamily="34" charset="0"/>
+                <a:cs typeface="Lato" panose="020F0502020204030203" pitchFamily="34" charset="0"/>
+              </a:rPr>
+              <a:t>Predictive Maintenance and Reliability:</a:t>
+            </a:r>
+            <a:r>
+              <a:rPr lang="en-US" sz="900" dirty="0">
+                <a:latin typeface="Lato" panose="020F0502020204030203" pitchFamily="34" charset="0"/>
+                <a:ea typeface="Lato" panose="020F0502020204030203" pitchFamily="34" charset="0"/>
+                <a:cs typeface="Lato" panose="020F0502020204030203" pitchFamily="34" charset="0"/>
+              </a:rPr>
+              <a:t> AI can predict and prevent potential technical issues, reducing downtime and ensuring a reliable platform. This reliability enhances customer trust and contributes to the sustainability of Lawn Buddy's reputation.</a:t>
+            </a:r>
+          </a:p>
+          <a:p>
+            <a:pPr marL="228600" indent="-228600">
+              <a:buFont typeface="+mj-lt"/>
+              <a:buAutoNum type="arabicPeriod"/>
+            </a:pPr>
+            <a:endParaRPr lang="en-US" sz="900" dirty="0">
+              <a:latin typeface="Lato" panose="020F0502020204030203" pitchFamily="34" charset="0"/>
+              <a:ea typeface="Lato" panose="020F0502020204030203" pitchFamily="34" charset="0"/>
+              <a:cs typeface="Lato" panose="020F0502020204030203" pitchFamily="34" charset="0"/>
+            </a:endParaRPr>
+          </a:p>
+          <a:p>
+            <a:pPr marL="228600" indent="-228600">
+              <a:buFont typeface="+mj-lt"/>
+              <a:buAutoNum type="arabicPeriod"/>
+            </a:pPr>
+            <a:r>
+              <a:rPr lang="en-US" sz="900" b="1" dirty="0">
+                <a:latin typeface="Lato" panose="020F0502020204030203" pitchFamily="34" charset="0"/>
+                <a:ea typeface="Lato" panose="020F0502020204030203" pitchFamily="34" charset="0"/>
+                <a:cs typeface="Lato" panose="020F0502020204030203" pitchFamily="34" charset="0"/>
+              </a:rPr>
+              <a:t>Market Insights and Expansion:</a:t>
+            </a:r>
+            <a:r>
+              <a:rPr lang="en-US" sz="900" dirty="0">
+                <a:latin typeface="Lato" panose="020F0502020204030203" pitchFamily="34" charset="0"/>
+                <a:ea typeface="Lato" panose="020F0502020204030203" pitchFamily="34" charset="0"/>
+                <a:cs typeface="Lato" panose="020F0502020204030203" pitchFamily="34" charset="0"/>
+              </a:rPr>
+              <a:t> AI-powered market analysis helps identify untapped markets and expansion opportunities. By leveraging AI's insights, Lawn Buddy can strategically enter new regions, fostering business sustainability through diversification.</a:t>
+            </a:r>
+          </a:p>
+          <a:p>
+            <a:pPr marL="228600" indent="-228600">
+              <a:buFont typeface="+mj-lt"/>
+              <a:buAutoNum type="arabicPeriod"/>
+            </a:pPr>
+            <a:endParaRPr lang="en-US" sz="900" dirty="0">
+              <a:latin typeface="Lato" panose="020F0502020204030203" pitchFamily="34" charset="0"/>
+              <a:ea typeface="Lato" panose="020F0502020204030203" pitchFamily="34" charset="0"/>
+              <a:cs typeface="Lato" panose="020F0502020204030203" pitchFamily="34" charset="0"/>
+            </a:endParaRPr>
+          </a:p>
+          <a:p>
+            <a:pPr marL="228600" indent="-228600">
+              <a:buFont typeface="+mj-lt"/>
+              <a:buAutoNum type="arabicPeriod"/>
+            </a:pPr>
+            <a:r>
+              <a:rPr lang="en-US" sz="900" b="1" dirty="0">
+                <a:latin typeface="Lato" panose="020F0502020204030203" pitchFamily="34" charset="0"/>
+                <a:ea typeface="Lato" panose="020F0502020204030203" pitchFamily="34" charset="0"/>
+                <a:cs typeface="Lato" panose="020F0502020204030203" pitchFamily="34" charset="0"/>
+              </a:rPr>
+              <a:t>Cost Optimization:</a:t>
+            </a:r>
+            <a:r>
+              <a:rPr lang="en-US" sz="900" dirty="0">
+                <a:latin typeface="Lato" panose="020F0502020204030203" pitchFamily="34" charset="0"/>
+                <a:ea typeface="Lato" panose="020F0502020204030203" pitchFamily="34" charset="0"/>
+                <a:cs typeface="Lato" panose="020F0502020204030203" pitchFamily="34" charset="0"/>
+              </a:rPr>
+              <a:t> AI-driven optimization techniques, such as route planning and demand prediction, help reduce operational costs. By minimizing expenses, Lawn Buddy improves its profit margins and overall financial viability.</a:t>
+            </a:r>
+          </a:p>
+          <a:p>
+            <a:pPr marL="228600" indent="-228600">
+              <a:buFont typeface="+mj-lt"/>
+              <a:buAutoNum type="arabicPeriod"/>
+            </a:pPr>
+            <a:endParaRPr lang="en-US" sz="900" dirty="0">
+              <a:latin typeface="Lato" panose="020F0502020204030203" pitchFamily="34" charset="0"/>
+              <a:ea typeface="Lato" panose="020F0502020204030203" pitchFamily="34" charset="0"/>
+              <a:cs typeface="Lato" panose="020F0502020204030203" pitchFamily="34" charset="0"/>
+            </a:endParaRPr>
+          </a:p>
+          <a:p>
+            <a:pPr marL="228600" indent="-228600">
+              <a:buFont typeface="+mj-lt"/>
+              <a:buAutoNum type="arabicPeriod"/>
+            </a:pPr>
+            <a:r>
+              <a:rPr lang="en-US" sz="900" b="1" dirty="0">
+                <a:latin typeface="Lato" panose="020F0502020204030203" pitchFamily="34" charset="0"/>
+                <a:ea typeface="Lato" panose="020F0502020204030203" pitchFamily="34" charset="0"/>
+                <a:cs typeface="Lato" panose="020F0502020204030203" pitchFamily="34" charset="0"/>
+              </a:rPr>
+              <a:t>Eco-Friendly Solutions:</a:t>
+            </a:r>
+            <a:r>
+              <a:rPr lang="en-US" sz="900" dirty="0">
+                <a:latin typeface="Lato" panose="020F0502020204030203" pitchFamily="34" charset="0"/>
+                <a:ea typeface="Lato" panose="020F0502020204030203" pitchFamily="34" charset="0"/>
+                <a:cs typeface="Lato" panose="020F0502020204030203" pitchFamily="34" charset="0"/>
+              </a:rPr>
+              <a:t> AI-driven route optimization reduces unnecessary travel, leading to lower fuel consumption and a reduced carbon footprint. This aligns with sustainability goals and enhances Lawn Buddy's environmental impact.</a:t>
+            </a:r>
+          </a:p>
+          <a:p>
+            <a:pPr marL="228600" indent="-228600">
+              <a:buFont typeface="+mj-lt"/>
+              <a:buAutoNum type="arabicPeriod"/>
+            </a:pPr>
+            <a:endParaRPr lang="en-US" sz="900" dirty="0">
+              <a:latin typeface="Lato" panose="020F0502020204030203" pitchFamily="34" charset="0"/>
+              <a:ea typeface="Lato" panose="020F0502020204030203" pitchFamily="34" charset="0"/>
+              <a:cs typeface="Lato" panose="020F0502020204030203" pitchFamily="34" charset="0"/>
+            </a:endParaRPr>
+          </a:p>
+          <a:p>
+            <a:pPr marL="228600" indent="-228600">
+              <a:buFont typeface="+mj-lt"/>
+              <a:buAutoNum type="arabicPeriod"/>
+            </a:pPr>
+            <a:r>
+              <a:rPr lang="en-US" sz="900" b="1" dirty="0">
+                <a:latin typeface="Lato" panose="020F0502020204030203" pitchFamily="34" charset="0"/>
+                <a:ea typeface="Lato" panose="020F0502020204030203" pitchFamily="34" charset="0"/>
+                <a:cs typeface="Lato" panose="020F0502020204030203" pitchFamily="34" charset="0"/>
+              </a:rPr>
+              <a:t>Competitive Advantage:</a:t>
+            </a:r>
+            <a:r>
+              <a:rPr lang="en-US" sz="900" dirty="0">
+                <a:latin typeface="Lato" panose="020F0502020204030203" pitchFamily="34" charset="0"/>
+                <a:ea typeface="Lato" panose="020F0502020204030203" pitchFamily="34" charset="0"/>
+                <a:cs typeface="Lato" panose="020F0502020204030203" pitchFamily="34" charset="0"/>
+              </a:rPr>
+              <a:t> By embracing AI technology, Lawn Buddy gains a competitive edge in the market. The ability to offer efficient, personalized services based on data-driven insights sets the app apart from traditional competitors, increasing its viability and sustainability.</a:t>
+            </a:r>
+          </a:p>
+          <a:p>
+            <a:pPr marL="228600" indent="-228600">
+              <a:buFont typeface="+mj-lt"/>
+              <a:buAutoNum type="arabicPeriod"/>
+            </a:pPr>
+            <a:endParaRPr lang="en-US" sz="900" dirty="0">
+              <a:latin typeface="Lato" panose="020F0502020204030203" pitchFamily="34" charset="0"/>
+              <a:ea typeface="Lato" panose="020F0502020204030203" pitchFamily="34" charset="0"/>
+              <a:cs typeface="Lato" panose="020F0502020204030203" pitchFamily="34" charset="0"/>
+            </a:endParaRPr>
+          </a:p>
+          <a:p>
+            <a:pPr marL="228600" indent="-228600">
+              <a:buFont typeface="+mj-lt"/>
+              <a:buAutoNum type="arabicPeriod"/>
+            </a:pPr>
+            <a:r>
+              <a:rPr lang="en-US" sz="900" b="1" dirty="0">
+                <a:latin typeface="Lato" panose="020F0502020204030203" pitchFamily="34" charset="0"/>
+                <a:ea typeface="Lato" panose="020F0502020204030203" pitchFamily="34" charset="0"/>
+                <a:cs typeface="Lato" panose="020F0502020204030203" pitchFamily="34" charset="0"/>
+              </a:rPr>
+              <a:t>Adaptation to Changing Trends: </a:t>
+            </a:r>
+            <a:r>
+              <a:rPr lang="en-US" sz="900" dirty="0">
+                <a:latin typeface="Lato" panose="020F0502020204030203" pitchFamily="34" charset="0"/>
+                <a:ea typeface="Lato" panose="020F0502020204030203" pitchFamily="34" charset="0"/>
+                <a:cs typeface="Lato" panose="020F0502020204030203" pitchFamily="34" charset="0"/>
+              </a:rPr>
+              <a:t>AI enables rapid adaptation to changing market trends and customer demands. As consumer preferences evolve, Lawn Buddy can quickly adjust its services and offerings to remain relevant and maintain its viability over time.</a:t>
+            </a:r>
           </a:p>
         </p:txBody>
       </p:sp>

</xml_diff>